<commit_message>
fixed the group shape cloning
</commit_message>
<xml_diff>
--- a/presenie/samples/sample_template1.pptx
+++ b/presenie/samples/sample_template1.pptx
@@ -2288,7 +2288,7 @@
           <a:p>
             <a:pPr algn="ctr"/>
             <a:r>
-              <a:rPr lang="en-AU" sz="1800" b="0" strike="noStrike" spc="-1">
+              <a:rPr lang="en-AU" sz="1800" b="0" strike="noStrike" spc="-1" dirty="0">
                 <a:latin typeface="Arial"/>
               </a:rPr>
               <a:t>{{@.name}}</a:t>
@@ -2409,7 +2409,7 @@
         </p:nvSpPr>
         <p:spPr>
           <a:xfrm>
-            <a:off x="1080000" y="2808000"/>
+            <a:off x="108000" y="4316289"/>
             <a:ext cx="1368000" cy="720000"/>
           </a:xfrm>
           <a:prstGeom prst="rect">
@@ -2442,10 +2442,32 @@
           <a:p>
             <a:pPr algn="ctr"/>
             <a:r>
-              <a:rPr lang="en-AU" sz="1200" b="0" strike="noStrike" spc="-1">
+              <a:rPr lang="en-AU" sz="1200" b="0" strike="noStrike" spc="-1" dirty="0">
+                <a:latin typeface="Arial"/>
+                <a:hlinkClick r:id="rId2"/>
+              </a:rPr>
+              <a:t>{{@.name}}’s</a:t>
+            </a:r>
+            <a:r>
+              <a:rPr lang="en-AU" sz="1200" b="0" strike="noStrike" spc="-1" dirty="0">
                 <a:latin typeface="Arial"/>
               </a:rPr>
-              <a:t>Favourite food is {{$.food[0]}}</a:t>
+              <a:t> </a:t>
+            </a:r>
+          </a:p>
+          <a:p>
+            <a:pPr algn="ctr"/>
+            <a:r>
+              <a:rPr lang="en-AU" sz="1200" spc="-1" dirty="0">
+                <a:latin typeface="Arial"/>
+              </a:rPr>
+              <a:t>f</a:t>
+            </a:r>
+            <a:r>
+              <a:rPr lang="en-AU" sz="1200" b="0" strike="noStrike" spc="-1" dirty="0">
+                <a:latin typeface="Arial"/>
+              </a:rPr>
+              <a:t>avourite food is {{@.food[0]}}</a:t>
             </a:r>
           </a:p>
         </p:txBody>
@@ -2563,102 +2585,6 @@
           </a:p>
         </p:txBody>
       </p:sp>
-      <p:grpSp>
-        <p:nvGrpSpPr>
-          <p:cNvPr id="46" name="Group 7"/>
-          <p:cNvGrpSpPr/>
-          <p:nvPr/>
-        </p:nvGrpSpPr>
-        <p:grpSpPr>
-          <a:xfrm>
-            <a:off x="3702327" y="2769530"/>
-            <a:ext cx="2863080" cy="796940"/>
-            <a:chOff x="4480920" y="4765680"/>
-            <a:chExt cx="2863080" cy="796940"/>
-          </a:xfrm>
-        </p:grpSpPr>
-        <p:sp>
-          <p:nvSpPr>
-            <p:cNvPr id="47" name="CustomShape 8"/>
-            <p:cNvSpPr/>
-            <p:nvPr/>
-          </p:nvSpPr>
-          <p:spPr>
-            <a:xfrm>
-              <a:off x="4559032" y="5112000"/>
-              <a:ext cx="2136886" cy="450620"/>
-            </a:xfrm>
-            <a:prstGeom prst="rect">
-              <a:avLst/>
-            </a:prstGeom>
-            <a:solidFill>
-              <a:srgbClr val="729FCF"/>
-            </a:solidFill>
-            <a:ln>
-              <a:solidFill>
-                <a:srgbClr val="3465A4"/>
-              </a:solidFill>
-            </a:ln>
-          </p:spPr>
-          <p:style>
-            <a:lnRef idx="0">
-              <a:scrgbClr r="0" g="0" b="0"/>
-            </a:lnRef>
-            <a:fillRef idx="0">
-              <a:scrgbClr r="0" g="0" b="0"/>
-            </a:fillRef>
-            <a:effectRef idx="0">
-              <a:scrgbClr r="0" g="0" b="0"/>
-            </a:effectRef>
-            <a:fontRef idx="minor"/>
-          </p:style>
-          <p:txBody>
-            <a:bodyPr wrap="none" lIns="90000" tIns="45000" rIns="90000" bIns="45000" anchor="ctr"/>
-            <a:lstStyle/>
-            <a:p>
-              <a:pPr algn="ctr"/>
-              <a:r>
-                <a:rPr lang="en-AU" sz="1800" b="0" strike="noStrike" spc="-1" dirty="0">
-                  <a:latin typeface="Arial"/>
-                </a:rPr>
-                <a:t>{{@}}</a:t>
-              </a:r>
-            </a:p>
-          </p:txBody>
-        </p:sp>
-        <p:sp>
-          <p:nvSpPr>
-            <p:cNvPr id="48" name="TextShape 9"/>
-            <p:cNvSpPr txBox="1"/>
-            <p:nvPr/>
-          </p:nvSpPr>
-          <p:spPr>
-            <a:xfrm>
-              <a:off x="4480920" y="4765680"/>
-              <a:ext cx="2863080" cy="346320"/>
-            </a:xfrm>
-            <a:prstGeom prst="rect">
-              <a:avLst/>
-            </a:prstGeom>
-            <a:noFill/>
-            <a:ln>
-              <a:noFill/>
-            </a:ln>
-          </p:spPr>
-          <p:txBody>
-            <a:bodyPr lIns="90000" tIns="45000" rIns="90000" bIns="45000"/>
-            <a:lstStyle/>
-            <a:p>
-              <a:r>
-                <a:rPr lang="en-AU" sz="1800" b="0" strike="noStrike" spc="-1">
-                  <a:latin typeface="Arial"/>
-                </a:rPr>
-                <a:t>{context=@.food[*] dir=90}</a:t>
-              </a:r>
-            </a:p>
-          </p:txBody>
-        </p:sp>
-      </p:grpSp>
       <p:sp>
         <p:nvSpPr>
           <p:cNvPr id="49" name="TextShape 10"/>
@@ -2667,7 +2593,7 @@
         </p:nvSpPr>
         <p:spPr>
           <a:xfrm>
-            <a:off x="5040000" y="1152000"/>
+            <a:off x="6491728" y="130320"/>
             <a:ext cx="3240000" cy="504000"/>
           </a:xfrm>
           <a:prstGeom prst="rect">
@@ -2683,7 +2609,7 @@
           <a:lstStyle/>
           <a:p>
             <a:r>
-              <a:rPr lang="en-AU" sz="1800" b="0" strike="noStrike" spc="-1">
+              <a:rPr lang="en-AU" sz="1100" b="0" strike="noStrike" spc="-1" dirty="0">
                 <a:latin typeface="Arial"/>
               </a:rPr>
               <a:t>A paragraph {{$.meta}}</a:t>
@@ -2695,10 +2621,16 @@
         <p:nvGraphicFramePr>
           <p:cNvPr id="50" name="Table 11"/>
           <p:cNvGraphicFramePr/>
-          <p:nvPr/>
+          <p:nvPr>
+            <p:extLst>
+              <p:ext uri="{D42A27DB-BD31-4B8C-83A1-F6EECF244321}">
+                <p14:modId xmlns:p14="http://schemas.microsoft.com/office/powerpoint/2010/main" val="4075170856"/>
+              </p:ext>
+            </p:extLst>
+          </p:nvPr>
         </p:nvGraphicFramePr>
         <p:xfrm>
-          <a:off x="6701400" y="1999440"/>
+          <a:off x="7680420" y="1951591"/>
           <a:ext cx="1343160" cy="640080"/>
         </p:xfrm>
         <a:graphic>
@@ -2767,7 +2699,7 @@
                     <a:lstStyle/>
                     <a:p>
                       <a:r>
-                        <a:rPr lang="en-AU" sz="1000" b="0" strike="noStrike" spc="-1">
+                        <a:rPr lang="en-AU" sz="1000" b="0" strike="noStrike" spc="-1" dirty="0">
                           <a:latin typeface="Arial"/>
                         </a:rPr>
                         <a:t>{{@}}</a:t>
@@ -2810,6 +2742,177 @@
           </a:graphicData>
         </a:graphic>
       </p:graphicFrame>
+      <p:grpSp>
+        <p:nvGrpSpPr>
+          <p:cNvPr id="4" name="Group 3">
+            <a:extLst>
+              <a:ext uri="{FF2B5EF4-FFF2-40B4-BE49-F238E27FC236}">
+                <a16:creationId xmlns:a16="http://schemas.microsoft.com/office/drawing/2014/main" id="{E78FFC11-95A5-8668-1B07-95F8D8883B2A}"/>
+              </a:ext>
+            </a:extLst>
+          </p:cNvPr>
+          <p:cNvGrpSpPr/>
+          <p:nvPr/>
+        </p:nvGrpSpPr>
+        <p:grpSpPr>
+          <a:xfrm>
+            <a:off x="3600000" y="1800000"/>
+            <a:ext cx="2221767" cy="602211"/>
+            <a:chOff x="3695558" y="2964259"/>
+            <a:chExt cx="2221767" cy="602211"/>
+          </a:xfrm>
+        </p:grpSpPr>
+        <p:sp>
+          <p:nvSpPr>
+            <p:cNvPr id="47" name="CustomShape 8"/>
+            <p:cNvSpPr/>
+            <p:nvPr/>
+          </p:nvSpPr>
+          <p:spPr>
+            <a:xfrm>
+              <a:off x="3780439" y="3115850"/>
+              <a:ext cx="2136886" cy="450620"/>
+            </a:xfrm>
+            <a:prstGeom prst="rect">
+              <a:avLst/>
+            </a:prstGeom>
+            <a:solidFill>
+              <a:srgbClr val="729FCF"/>
+            </a:solidFill>
+            <a:ln>
+              <a:solidFill>
+                <a:srgbClr val="3465A4"/>
+              </a:solidFill>
+            </a:ln>
+          </p:spPr>
+          <p:style>
+            <a:lnRef idx="0">
+              <a:scrgbClr r="0" g="0" b="0"/>
+            </a:lnRef>
+            <a:fillRef idx="0">
+              <a:scrgbClr r="0" g="0" b="0"/>
+            </a:fillRef>
+            <a:effectRef idx="0">
+              <a:scrgbClr r="0" g="0" b="0"/>
+            </a:effectRef>
+            <a:fontRef idx="minor"/>
+          </p:style>
+          <p:txBody>
+            <a:bodyPr wrap="none" lIns="90000" tIns="45000" rIns="90000" bIns="45000" anchor="ctr"/>
+            <a:lstStyle/>
+            <a:p>
+              <a:pPr algn="ctr"/>
+              <a:r>
+                <a:rPr lang="en-AU" sz="1800" b="0" strike="noStrike" spc="-1" dirty="0">
+                  <a:latin typeface="Arial"/>
+                </a:rPr>
+                <a:t>{{@}}</a:t>
+              </a:r>
+            </a:p>
+          </p:txBody>
+        </p:sp>
+        <p:sp>
+          <p:nvSpPr>
+            <p:cNvPr id="48" name="TextShape 9"/>
+            <p:cNvSpPr txBox="1"/>
+            <p:nvPr/>
+          </p:nvSpPr>
+          <p:spPr>
+            <a:xfrm>
+              <a:off x="3695558" y="2964259"/>
+              <a:ext cx="1153324" cy="151591"/>
+            </a:xfrm>
+            <a:prstGeom prst="rect">
+              <a:avLst/>
+            </a:prstGeom>
+            <a:noFill/>
+            <a:ln>
+              <a:noFill/>
+            </a:ln>
+          </p:spPr>
+          <p:txBody>
+            <a:bodyPr lIns="90000" tIns="45000" rIns="90000" bIns="45000"/>
+            <a:lstStyle/>
+            <a:p>
+              <a:r>
+                <a:rPr lang="en-AU" sz="500" b="0" strike="noStrike" spc="-1" dirty="0">
+                  <a:latin typeface="Arial"/>
+                </a:rPr>
+                <a:t>{context=@.food[*] </a:t>
+              </a:r>
+              <a:r>
+                <a:rPr lang="en-AU" sz="500" b="0" strike="noStrike" spc="-1" dirty="0" err="1">
+                  <a:latin typeface="Arial"/>
+                </a:rPr>
+                <a:t>dir</a:t>
+              </a:r>
+              <a:r>
+                <a:rPr lang="en-AU" sz="500" b="0" strike="noStrike" spc="-1" dirty="0">
+                  <a:latin typeface="Arial"/>
+                </a:rPr>
+                <a:t>=90 gap=2}</a:t>
+              </a:r>
+            </a:p>
+          </p:txBody>
+        </p:sp>
+        <p:sp>
+          <p:nvSpPr>
+            <p:cNvPr id="2" name="Triangle 1">
+              <a:extLst>
+                <a:ext uri="{FF2B5EF4-FFF2-40B4-BE49-F238E27FC236}">
+                  <a16:creationId xmlns:a16="http://schemas.microsoft.com/office/drawing/2014/main" id="{1D65EDB6-1B4B-7C82-70BC-5590ABB39523}"/>
+                </a:ext>
+              </a:extLst>
+            </p:cNvPr>
+            <p:cNvSpPr/>
+            <p:nvPr/>
+          </p:nvSpPr>
+          <p:spPr>
+            <a:xfrm rot="5400000">
+              <a:off x="3712107" y="3132014"/>
+              <a:ext cx="151591" cy="119263"/>
+            </a:xfrm>
+            <a:prstGeom prst="triangle">
+              <a:avLst/>
+            </a:prstGeom>
+            <a:solidFill>
+              <a:srgbClr val="92D050"/>
+            </a:solidFill>
+            <a:ln w="12700">
+              <a:solidFill>
+                <a:schemeClr val="tx1">
+                  <a:lumMod val="75000"/>
+                  <a:lumOff val="25000"/>
+                </a:schemeClr>
+              </a:solidFill>
+            </a:ln>
+          </p:spPr>
+          <p:style>
+            <a:lnRef idx="2">
+              <a:schemeClr val="accent1">
+                <a:shade val="15000"/>
+              </a:schemeClr>
+            </a:lnRef>
+            <a:fillRef idx="1">
+              <a:schemeClr val="accent1"/>
+            </a:fillRef>
+            <a:effectRef idx="0">
+              <a:schemeClr val="accent1"/>
+            </a:effectRef>
+            <a:fontRef idx="minor">
+              <a:schemeClr val="lt1"/>
+            </a:fontRef>
+          </p:style>
+          <p:txBody>
+            <a:bodyPr rtlCol="0" anchor="ctr"/>
+            <a:lstStyle/>
+            <a:p>
+              <a:pPr algn="ctr"/>
+              <a:endParaRPr lang="en-US"/>
+            </a:p>
+          </p:txBody>
+        </p:sp>
+      </p:grpSp>
     </p:spTree>
   </p:cSld>
   <p:clrMapOvr>

</xml_diff>